<commit_message>
progress on frameworks pres
</commit_message>
<xml_diff>
--- a/written_assignments/Saenzpardo_Jesus_Frameworks_Presentation.pptx
+++ b/written_assignments/Saenzpardo_Jesus_Frameworks_Presentation.pptx
@@ -289,7 +289,7 @@
           <a:p>
             <a:fld id="{BA5A207F-0F91-42F2-96D0-049C6003623B}" type="datetimeFigureOut">
               <a:rPr lang="en-US"/>
-              <a:t>10/19/2020</a:t>
+              <a:t>10/20/2020</a:t>
             </a:fld>
             <a:endParaRPr/>
           </a:p>
@@ -454,7 +454,7 @@
           <a:p>
             <a:fld id="{48CC13F5-F2B1-464B-BE8F-27ABFBD2FBDE}" type="datetimeFigureOut">
               <a:rPr lang="en-US"/>
-              <a:t>10/19/2020</a:t>
+              <a:t>10/20/2020</a:t>
             </a:fld>
             <a:endParaRPr/>
           </a:p>
@@ -921,7 +921,7 @@
           <a:p>
             <a:fld id="{99D2A58A-F6A3-44B4-8553-CA3EAF252FB7}" type="datetime1">
               <a:rPr lang="en-US" smtClean="0"/>
-              <a:t>10/19/2020</a:t>
+              <a:t>10/20/2020</a:t>
             </a:fld>
             <a:endParaRPr lang="en-US"/>
           </a:p>
@@ -1122,7 +1122,7 @@
           <a:p>
             <a:fld id="{3B8F513F-1C7D-48A3-9E66-761794785CC6}" type="datetime1">
               <a:rPr lang="en-US" smtClean="0"/>
-              <a:t>10/19/2020</a:t>
+              <a:t>10/20/2020</a:t>
             </a:fld>
             <a:endParaRPr lang="en-US"/>
           </a:p>
@@ -1333,7 +1333,7 @@
           <a:p>
             <a:fld id="{805BC340-5827-402A-ABD7-86B6900F77A8}" type="datetime1">
               <a:rPr lang="en-US" smtClean="0"/>
-              <a:t>10/19/2020</a:t>
+              <a:t>10/20/2020</a:t>
             </a:fld>
             <a:endParaRPr lang="en-US"/>
           </a:p>
@@ -1534,7 +1534,7 @@
           <a:p>
             <a:fld id="{DD05BD3E-AD23-4233-B7FD-BCC74AA741B1}" type="datetime1">
               <a:rPr lang="en-US" smtClean="0"/>
-              <a:t>10/19/2020</a:t>
+              <a:t>10/20/2020</a:t>
             </a:fld>
             <a:endParaRPr lang="en-US"/>
           </a:p>
@@ -1801,7 +1801,7 @@
           <a:p>
             <a:fld id="{D1F85C56-1C19-4454-A6D4-FDB294070137}" type="datetime1">
               <a:rPr lang="en-US" smtClean="0"/>
-              <a:t>10/19/2020</a:t>
+              <a:t>10/20/2020</a:t>
             </a:fld>
             <a:endParaRPr lang="en-US"/>
           </a:p>
@@ -2108,7 +2108,7 @@
           <a:p>
             <a:fld id="{9CAAEA3F-BC83-4494-8BB2-CF9729692A8C}" type="datetime1">
               <a:rPr lang="en-US" smtClean="0"/>
-              <a:t>10/19/2020</a:t>
+              <a:t>10/20/2020</a:t>
             </a:fld>
             <a:endParaRPr lang="en-US"/>
           </a:p>
@@ -2560,7 +2560,7 @@
           <a:p>
             <a:fld id="{B48BCFC3-C38C-4973-9593-9C0AA203E374}" type="datetime1">
               <a:rPr lang="en-US" smtClean="0"/>
-              <a:t>10/19/2020</a:t>
+              <a:t>10/20/2020</a:t>
             </a:fld>
             <a:endParaRPr lang="en-US"/>
           </a:p>
@@ -2693,7 +2693,7 @@
           <a:p>
             <a:fld id="{7B00E9B8-A638-47B9-8EAF-A06FB35BB403}" type="datetime1">
               <a:rPr lang="en-US" smtClean="0"/>
-              <a:t>10/19/2020</a:t>
+              <a:t>10/20/2020</a:t>
             </a:fld>
             <a:endParaRPr lang="en-US"/>
           </a:p>
@@ -2803,7 +2803,7 @@
           <a:p>
             <a:fld id="{DA0414C0-40BC-46FB-ADE3-F7141007B5FB}" type="datetime1">
               <a:rPr lang="en-US" smtClean="0"/>
-              <a:t>10/19/2020</a:t>
+              <a:t>10/20/2020</a:t>
             </a:fld>
             <a:endParaRPr lang="en-US"/>
           </a:p>
@@ -3102,7 +3102,7 @@
           <a:p>
             <a:fld id="{9018BC97-2F5E-4770-AEEF-8F2730A3EA80}" type="datetime1">
               <a:rPr lang="en-US" smtClean="0"/>
-              <a:t>10/19/2020</a:t>
+              <a:t>10/20/2020</a:t>
             </a:fld>
             <a:endParaRPr lang="en-US"/>
           </a:p>
@@ -3554,7 +3554,7 @@
             <a:fld id="{41B0D41C-F0D3-49F0-8041-67FC705A40C6}" type="datetime1">
               <a:rPr lang="en-US" smtClean="0"/>
               <a:pPr/>
-              <a:t>10/19/2020</a:t>
+              <a:t>10/20/2020</a:t>
             </a:fld>
             <a:endParaRPr lang="en-US"/>
           </a:p>
@@ -5324,7 +5324,7 @@
           <a:p>
             <a:r>
               <a:rPr lang="en-US" dirty="0"/>
-              <a:t>User interface design pattern</a:t>
+              <a:t>It’s a design pattern</a:t>
             </a:r>
           </a:p>
           <a:p>
@@ -5829,8 +5829,61 @@
         </p:nvSpPr>
         <p:spPr/>
         <p:txBody>
-          <a:bodyPr/>
+          <a:bodyPr>
+            <a:normAutofit fontScale="92500" lnSpcReduction="10000"/>
+          </a:bodyPr>
           <a:lstStyle/>
+          <a:p>
+            <a:r>
+              <a:rPr lang="en-US" dirty="0"/>
+              <a:t>MVC solves backend scalability issues without manually mapping out every controller path</a:t>
+            </a:r>
+          </a:p>
+          <a:p>
+            <a:r>
+              <a:rPr lang="en-US" dirty="0"/>
+              <a:t>Solves a programming problem, not a business issue problem</a:t>
+            </a:r>
+          </a:p>
+          <a:p>
+            <a:r>
+              <a:rPr lang="en-US" dirty="0"/>
+              <a:t>Simplifies and standardizes code through reflection (code that can inspect other code) and expression trees</a:t>
+            </a:r>
+          </a:p>
+          <a:p>
+            <a:r>
+              <a:rPr lang="en-US" dirty="0"/>
+              <a:t>Creates a convention that is easy to understand while minimizing needed code and maximizing code re-use</a:t>
+            </a:r>
+          </a:p>
+          <a:p>
+            <a:r>
+              <a:rPr lang="en-US" dirty="0"/>
+              <a:t>All popular languages have MVC frameworks that are constantly updated</a:t>
+            </a:r>
+          </a:p>
+          <a:p>
+            <a:r>
+              <a:rPr lang="en-US" dirty="0"/>
+              <a:t>Model will store the data</a:t>
+            </a:r>
+          </a:p>
+          <a:p>
+            <a:r>
+              <a:rPr lang="en-US" dirty="0"/>
+              <a:t>UI Components make up the view</a:t>
+            </a:r>
+          </a:p>
+          <a:p>
+            <a:r>
+              <a:rPr lang="en-US" dirty="0"/>
+              <a:t>The controller will be made up of code</a:t>
+            </a:r>
+          </a:p>
+          <a:p>
+            <a:endParaRPr lang="en-US" dirty="0"/>
+          </a:p>
           <a:p>
             <a:endParaRPr lang="en-US" dirty="0"/>
           </a:p>
@@ -5901,7 +5954,15 @@
           <a:p>
             <a:r>
               <a:rPr lang="en-US" dirty="0"/>
-              <a:t>But we can use a virtual DOM?</a:t>
+              <a:t>Model-View-</a:t>
+            </a:r>
+            <a:r>
+              <a:rPr lang="en-US" dirty="0" err="1"/>
+              <a:t>ViewModel</a:t>
+            </a:r>
+            <a:r>
+              <a:rPr lang="en-US" dirty="0"/>
+              <a:t> </a:t>
             </a:r>
           </a:p>
         </p:txBody>
@@ -5924,10 +5985,61 @@
         </p:nvSpPr>
         <p:spPr/>
         <p:txBody>
-          <a:bodyPr/>
+          <a:bodyPr>
+            <a:normAutofit fontScale="92500" lnSpcReduction="10000"/>
+          </a:bodyPr>
           <a:lstStyle/>
           <a:p>
-            <a:endParaRPr lang="en-US"/>
+            <a:r>
+              <a:rPr lang="en-US" dirty="0"/>
+              <a:t>Model – again stores the data</a:t>
+            </a:r>
+          </a:p>
+          <a:p>
+            <a:endParaRPr lang="en-US" dirty="0"/>
+          </a:p>
+          <a:p>
+            <a:r>
+              <a:rPr lang="en-US" dirty="0"/>
+              <a:t>View – Visual module (what the user sees)</a:t>
+            </a:r>
+          </a:p>
+          <a:p>
+            <a:endParaRPr lang="en-US" dirty="0"/>
+          </a:p>
+          <a:p>
+            <a:r>
+              <a:rPr lang="en-US" dirty="0"/>
+              <a:t>View-Model – interfacing system between Model and View</a:t>
+            </a:r>
+          </a:p>
+          <a:p>
+            <a:endParaRPr lang="en-US" dirty="0"/>
+          </a:p>
+          <a:p>
+            <a:r>
+              <a:rPr lang="en-US" dirty="0"/>
+              <a:t>Using this design patter, we can store user input into the Model and we can update the </a:t>
+            </a:r>
+            <a:r>
+              <a:rPr lang="en-US" dirty="0" err="1"/>
+              <a:t>ViewModel</a:t>
+            </a:r>
+            <a:r>
+              <a:rPr lang="en-US" dirty="0"/>
+              <a:t> and render this information to the View.</a:t>
+            </a:r>
+          </a:p>
+          <a:p>
+            <a:r>
+              <a:rPr lang="en-US" dirty="0"/>
+              <a:t>Vue and React utilize this design pattern along with a Virtual DOM dramatically increasing the speed and efficiency of </a:t>
+            </a:r>
+            <a:r>
+              <a:rPr lang="en-US"/>
+              <a:t>DOM updates.  </a:t>
+            </a:r>
+            <a:endParaRPr lang="en-US" dirty="0"/>
           </a:p>
         </p:txBody>
       </p:sp>
@@ -8693,15 +8805,6 @@
 </file>
 
 <file path=customXml/item2.xml><?xml version="1.0" encoding="utf-8"?>
-<?mso-contentType ?>
-<FormTemplates xmlns="http://schemas.microsoft.com/sharepoint/v3/contenttype/forms">
-  <Display>DocumentLibraryForm</Display>
-  <Edit>DocumentLibraryForm</Edit>
-  <New>DocumentLibraryForm</New>
-</FormTemplates>
-</file>
-
-<file path=customXml/item3.xml><?xml version="1.0" encoding="utf-8"?>
 <ct:contentTypeSchema xmlns:ct="http://schemas.microsoft.com/office/2006/metadata/contentType" xmlns:ma="http://schemas.microsoft.com/office/2006/metadata/properties/metaAttributes" ct:_="" ma:_="" ma:contentTypeName="Document" ma:contentTypeID="0x010100AA3F7D94069FF64A86F7DFF56D60E3BE" ma:contentTypeVersion="6" ma:contentTypeDescription="Create a new document." ma:contentTypeScope="" ma:versionID="c32302c77d4085ecf495bdddb7f5e889">
   <xsd:schema xmlns:xsd="http://www.w3.org/2001/XMLSchema" xmlns:xs="http://www.w3.org/2001/XMLSchema" xmlns:p="http://schemas.microsoft.com/office/2006/metadata/properties" xmlns:ns2="a4f35948-e619-41b3-aa29-22878b09cfd2" xmlns:ns3="40262f94-9f35-4ac3-9a90-690165a166b7" targetNamespace="http://schemas.microsoft.com/office/2006/metadata/properties" ma:root="true" ma:fieldsID="4ab5ae46be95f9d0be6107e8200be7a2" ns2:_="" ns3:_="">
     <xsd:import namespace="a4f35948-e619-41b3-aa29-22878b09cfd2"/>
@@ -8882,6 +8985,15 @@
 </ct:contentTypeSchema>
 </file>
 
+<file path=customXml/item3.xml><?xml version="1.0" encoding="utf-8"?>
+<?mso-contentType ?>
+<FormTemplates xmlns="http://schemas.microsoft.com/sharepoint/v3/contenttype/forms">
+  <Display>DocumentLibraryForm</Display>
+  <Edit>DocumentLibraryForm</Edit>
+  <New>DocumentLibraryForm</New>
+</FormTemplates>
+</file>
+
 <file path=customXml/itemProps1.xml><?xml version="1.0" encoding="utf-8"?>
 <ds:datastoreItem xmlns:ds="http://schemas.openxmlformats.org/officeDocument/2006/customXml" ds:itemID="{02427FAC-CD3A-494C-985C-09E26C5EA507}">
   <ds:schemaRefs>
@@ -8900,14 +9012,6 @@
 </file>
 
 <file path=customXml/itemProps2.xml><?xml version="1.0" encoding="utf-8"?>
-<ds:datastoreItem xmlns:ds="http://schemas.openxmlformats.org/officeDocument/2006/customXml" ds:itemID="{B11D6E40-F509-498A-BF02-00C895783B4A}">
-  <ds:schemaRefs>
-    <ds:schemaRef ds:uri="http://schemas.microsoft.com/sharepoint/v3/contenttype/forms"/>
-  </ds:schemaRefs>
-</ds:datastoreItem>
-</file>
-
-<file path=customXml/itemProps3.xml><?xml version="1.0" encoding="utf-8"?>
 <ds:datastoreItem xmlns:ds="http://schemas.openxmlformats.org/officeDocument/2006/customXml" ds:itemID="{E5ED73A5-C2D2-4D49-BB89-167E8E32C957}">
   <ds:schemaRefs>
     <ds:schemaRef ds:uri="http://schemas.microsoft.com/office/2006/metadata/contentType"/>
@@ -8924,4 +9028,12 @@
     <ds:schemaRef ds:uri="http://schemas.microsoft.com/internal/obd"/>
   </ds:schemaRefs>
 </ds:datastoreItem>
+</file>
+
+<file path=customXml/itemProps3.xml><?xml version="1.0" encoding="utf-8"?>
+<ds:datastoreItem xmlns:ds="http://schemas.openxmlformats.org/officeDocument/2006/customXml" ds:itemID="{B11D6E40-F509-498A-BF02-00C895783B4A}">
+  <ds:schemaRefs>
+    <ds:schemaRef ds:uri="http://schemas.microsoft.com/sharepoint/v3/contenttype/forms"/>
+  </ds:schemaRefs>
+</ds:datastoreItem>
 </file>
</xml_diff>